<commit_message>
changed PPT and extra docs about architecture
</commit_message>
<xml_diff>
--- a/PPT/04- Angular Component Tree.pptx
+++ b/PPT/04- Angular Component Tree.pptx
@@ -2753,7 +2753,7 @@
           <a:p>
             <a:fld id="{3684521C-F147-C24A-A391-648ECBD2901C}" type="datetime1">
               <a:rPr lang="en-US" smtClean="0"/>
-              <a:t>4/23/21</a:t>
+              <a:t>12/17/21</a:t>
             </a:fld>
             <a:endParaRPr lang="en-US"/>
           </a:p>
@@ -2907,7 +2907,7 @@
           <a:p>
             <a:fld id="{E850CB69-7D8B-9F4E-BED9-901DCAE946AB}" type="datetime1">
               <a:rPr lang="en-US" smtClean="0"/>
-              <a:t>4/23/21</a:t>
+              <a:t>12/17/21</a:t>
             </a:fld>
             <a:endParaRPr lang="en-US"/>
           </a:p>
@@ -3140,7 +3140,7 @@
           <a:p>
             <a:fld id="{FDA6B9DC-9839-E24A-9DBE-68BCC9C6D304}" type="datetime1">
               <a:rPr lang="en-US" smtClean="0"/>
-              <a:t>4/23/21</a:t>
+              <a:t>12/17/21</a:t>
             </a:fld>
             <a:endParaRPr lang="en-US"/>
           </a:p>
@@ -3265,7 +3265,7 @@
           <a:p>
             <a:fld id="{16B0123C-B19C-2541-A249-CC118E280FC0}" type="datetime1">
               <a:rPr lang="en-US" smtClean="0"/>
-              <a:t>4/23/21</a:t>
+              <a:t>12/17/21</a:t>
             </a:fld>
             <a:endParaRPr lang="en-US"/>
           </a:p>
@@ -3361,7 +3361,7 @@
           <a:p>
             <a:fld id="{7A20ED1D-FFB4-6144-9B3D-3C04FD3360E4}" type="datetime1">
               <a:rPr lang="en-US" smtClean="0"/>
-              <a:t>4/23/21</a:t>
+              <a:t>12/17/21</a:t>
             </a:fld>
             <a:endParaRPr lang="en-US"/>
           </a:p>
@@ -4213,7 +4213,7 @@
           <a:p>
             <a:fld id="{5ADC4E92-36BB-AA43-A533-B6B376F1612C}" type="datetime1">
               <a:rPr lang="en-US" smtClean="0"/>
-              <a:t>4/23/21</a:t>
+              <a:t>12/17/21</a:t>
             </a:fld>
             <a:endParaRPr lang="en-US"/>
           </a:p>
@@ -12070,7 +12070,7 @@
         <p:spPr>
           <a:xfrm>
             <a:off x="1469276" y="3828765"/>
-            <a:ext cx="8957945" cy="3237230"/>
+            <a:ext cx="8957945" cy="3300904"/>
           </a:xfrm>
           <a:prstGeom prst="rect">
             <a:avLst/>
@@ -12663,11 +12663,25 @@
               <a:t>	</a:t>
             </a:r>
             <a:r>
+              <a:rPr sz="1950" spc="-20" dirty="0" err="1">
+                <a:latin typeface="Consolas"/>
+                <a:cs typeface="Consolas"/>
+              </a:rPr>
+              <a:t>CityDetail</a:t>
+            </a:r>
+            <a:r>
+              <a:rPr lang="nl-NL" sz="1950" spc="-20" dirty="0">
+                <a:latin typeface="Consolas"/>
+                <a:cs typeface="Consolas"/>
+              </a:rPr>
+              <a:t>Component</a:t>
+            </a:r>
+            <a:r>
               <a:rPr sz="1950" spc="-20" dirty="0">
                 <a:latin typeface="Consolas"/>
                 <a:cs typeface="Consolas"/>
               </a:rPr>
-              <a:t>CityDetail{</a:t>
+              <a:t>{</a:t>
             </a:r>
             <a:endParaRPr sz="1950" dirty="0">
               <a:latin typeface="Consolas"/>
@@ -46649,7 +46663,7 @@
         <p:spPr>
           <a:xfrm>
             <a:off x="1469276" y="3828765"/>
-            <a:ext cx="8957945" cy="3237230"/>
+            <a:ext cx="8957945" cy="3300904"/>
           </a:xfrm>
           <a:prstGeom prst="rect">
             <a:avLst/>
@@ -46842,7 +46856,7 @@
               </a:rPr>
               <a:t>stad]&lt;/li&gt;</a:t>
             </a:r>
-            <a:endParaRPr sz="1950">
+            <a:endParaRPr sz="1950" dirty="0">
               <a:latin typeface="Consolas"/>
               <a:cs typeface="Consolas"/>
             </a:endParaRPr>
@@ -46967,7 +46981,7 @@
               </a:rPr>
               <a:t>[provincie]&lt;/li&gt;</a:t>
             </a:r>
-            <a:endParaRPr sz="1950">
+            <a:endParaRPr sz="1950" dirty="0">
               <a:latin typeface="Consolas"/>
               <a:cs typeface="Consolas"/>
             </a:endParaRPr>
@@ -47092,7 +47106,7 @@
               </a:rPr>
               <a:t>[highlights]&lt;/li&gt;</a:t>
             </a:r>
-            <a:endParaRPr sz="1950">
+            <a:endParaRPr sz="1950" dirty="0">
               <a:latin typeface="Consolas"/>
               <a:cs typeface="Consolas"/>
             </a:endParaRPr>
@@ -47113,7 +47127,7 @@
               </a:rPr>
               <a:t>&lt;/ul&gt;</a:t>
             </a:r>
-            <a:endParaRPr sz="1950">
+            <a:endParaRPr sz="1950" dirty="0">
               <a:latin typeface="Consolas"/>
               <a:cs typeface="Consolas"/>
             </a:endParaRPr>
@@ -47134,7 +47148,7 @@
               </a:rPr>
               <a:t>`</a:t>
             </a:r>
-            <a:endParaRPr sz="1950">
+            <a:endParaRPr sz="1950" dirty="0">
               <a:latin typeface="Consolas"/>
               <a:cs typeface="Consolas"/>
             </a:endParaRPr>
@@ -47152,7 +47166,7 @@
               </a:rPr>
               <a:t>})</a:t>
             </a:r>
-            <a:endParaRPr sz="1950">
+            <a:endParaRPr sz="1950" dirty="0">
               <a:latin typeface="Consolas"/>
               <a:cs typeface="Consolas"/>
             </a:endParaRPr>
@@ -47166,7 +47180,7 @@
                 <a:spcPts val="22"/>
               </a:spcBef>
             </a:pPr>
-            <a:endParaRPr sz="2000">
+            <a:endParaRPr sz="2000" dirty="0">
               <a:latin typeface="Times New Roman"/>
               <a:cs typeface="Times New Roman"/>
             </a:endParaRPr>
@@ -47242,13 +47256,27 @@
               <a:t>	</a:t>
             </a:r>
             <a:r>
+              <a:rPr sz="1950" spc="-20" dirty="0" err="1">
+                <a:latin typeface="Consolas"/>
+                <a:cs typeface="Consolas"/>
+              </a:rPr>
+              <a:t>CityDetail</a:t>
+            </a:r>
+            <a:r>
+              <a:rPr lang="nl-NL" sz="1950" spc="-20" dirty="0">
+                <a:latin typeface="Consolas"/>
+                <a:cs typeface="Consolas"/>
+              </a:rPr>
+              <a:t>Component</a:t>
+            </a:r>
+            <a:r>
               <a:rPr sz="1950" spc="-20" dirty="0">
                 <a:latin typeface="Consolas"/>
                 <a:cs typeface="Consolas"/>
               </a:rPr>
-              <a:t>CityDetail{</a:t>
-            </a:r>
-            <a:endParaRPr sz="1950">
+              <a:t>{</a:t>
+            </a:r>
+            <a:endParaRPr sz="1950" dirty="0">
               <a:latin typeface="Consolas"/>
               <a:cs typeface="Consolas"/>
             </a:endParaRPr>
@@ -47259,7 +47287,7 @@
                 <a:spcPct val="100000"/>
               </a:lnSpc>
             </a:pPr>
-            <a:endParaRPr sz="1900">
+            <a:endParaRPr sz="1900" dirty="0">
               <a:latin typeface="Times New Roman"/>
               <a:cs typeface="Times New Roman"/>
             </a:endParaRPr>
@@ -47273,7 +47301,7 @@
                 <a:spcPts val="28"/>
               </a:spcBef>
             </a:pPr>
-            <a:endParaRPr sz="2150">
+            <a:endParaRPr sz="2150" dirty="0">
               <a:latin typeface="Times New Roman"/>
               <a:cs typeface="Times New Roman"/>
             </a:endParaRPr>
@@ -47291,7 +47319,7 @@
               </a:rPr>
               <a:t>}</a:t>
             </a:r>
-            <a:endParaRPr sz="1950">
+            <a:endParaRPr sz="1950" dirty="0">
               <a:latin typeface="Consolas"/>
               <a:cs typeface="Consolas"/>
             </a:endParaRPr>
@@ -47771,7 +47799,7 @@
               </a:rPr>
               <a:t>app.module.ts</a:t>
             </a:r>
-            <a:endParaRPr sz="1700">
+            <a:endParaRPr sz="1700" dirty="0">
               <a:latin typeface="Consolas"/>
               <a:cs typeface="Consolas"/>
             </a:endParaRPr>
@@ -47795,7 +47823,7 @@
               </a:rPr>
               <a:t>…</a:t>
             </a:r>
-            <a:endParaRPr sz="1700">
+            <a:endParaRPr sz="1700" dirty="0">
               <a:latin typeface="Consolas"/>
               <a:cs typeface="Consolas"/>
             </a:endParaRPr>
@@ -48088,7 +48116,7 @@
               </a:rPr>
               <a:t>invoegen</a:t>
             </a:r>
-            <a:endParaRPr sz="1700">
+            <a:endParaRPr sz="1700" dirty="0">
               <a:latin typeface="Consolas"/>
               <a:cs typeface="Consolas"/>
             </a:endParaRPr>
@@ -48104,7 +48132,7 @@
         <p:spPr>
           <a:xfrm>
             <a:off x="1275588" y="2750367"/>
-            <a:ext cx="3742690" cy="1034415"/>
+            <a:ext cx="4909312" cy="1308050"/>
           </a:xfrm>
           <a:prstGeom prst="rect">
             <a:avLst/>
@@ -48128,7 +48156,7 @@
               </a:rPr>
               <a:t>@ngModule({</a:t>
             </a:r>
-            <a:endParaRPr sz="1700">
+            <a:endParaRPr sz="1700" dirty="0">
               <a:latin typeface="Consolas"/>
               <a:cs typeface="Consolas"/>
             </a:endParaRPr>
@@ -48149,7 +48177,7 @@
               </a:rPr>
               <a:t>…</a:t>
             </a:r>
-            <a:endParaRPr sz="1700">
+            <a:endParaRPr sz="1700" dirty="0">
               <a:latin typeface="Consolas"/>
               <a:cs typeface="Consolas"/>
             </a:endParaRPr>
@@ -48178,27 +48206,34 @@
               <a:t>:</a:t>
             </a:r>
             <a:r>
-              <a:rPr sz="1700" dirty="0">
-                <a:latin typeface="Times New Roman"/>
-                <a:cs typeface="Times New Roman"/>
-              </a:rPr>
-              <a:t> </a:t>
-            </a:r>
-            <a:r>
-              <a:rPr sz="1700" spc="75" dirty="0">
-                <a:latin typeface="Times New Roman"/>
-                <a:cs typeface="Times New Roman"/>
-              </a:rPr>
-              <a:t> </a:t>
-            </a:r>
-            <a:r>
               <a:rPr sz="1700" spc="-5" dirty="0">
                 <a:latin typeface="Consolas"/>
                 <a:cs typeface="Consolas"/>
               </a:rPr>
-              <a:t>[…,CityDetail]</a:t>
-            </a:r>
-            <a:endParaRPr sz="1700">
+              <a:t>[…,</a:t>
+            </a:r>
+            <a:r>
+              <a:rPr sz="1700" spc="-5" dirty="0" err="1">
+                <a:latin typeface="Consolas"/>
+                <a:cs typeface="Consolas"/>
+              </a:rPr>
+              <a:t>CityDetail</a:t>
+            </a:r>
+            <a:r>
+              <a:rPr lang="nl-NL" sz="1700" spc="-5" dirty="0">
+                <a:latin typeface="Consolas"/>
+                <a:cs typeface="Consolas"/>
+              </a:rPr>
+              <a:t>Component</a:t>
+            </a:r>
+            <a:r>
+              <a:rPr sz="1700" spc="-5" dirty="0">
+                <a:latin typeface="Consolas"/>
+                <a:cs typeface="Consolas"/>
+              </a:rPr>
+              <a:t>]</a:t>
+            </a:r>
+            <a:endParaRPr sz="1700" dirty="0">
               <a:latin typeface="Consolas"/>
               <a:cs typeface="Consolas"/>
             </a:endParaRPr>
@@ -48219,7 +48254,21 @@
               </a:rPr>
               <a:t>})</a:t>
             </a:r>
-            <a:endParaRPr sz="1700">
+            <a:endParaRPr lang="nl-NL" sz="1700" dirty="0">
+              <a:latin typeface="Consolas"/>
+              <a:cs typeface="Consolas"/>
+            </a:endParaRPr>
+          </a:p>
+          <a:p>
+            <a:pPr marL="12700">
+              <a:lnSpc>
+                <a:spcPct val="100000"/>
+              </a:lnSpc>
+              <a:spcBef>
+                <a:spcPts val="35"/>
+              </a:spcBef>
+            </a:pPr>
+            <a:endParaRPr sz="1700" dirty="0">
               <a:latin typeface="Consolas"/>
               <a:cs typeface="Consolas"/>
             </a:endParaRPr>
@@ -48234,8 +48283,8 @@
         </p:nvSpPr>
         <p:spPr>
           <a:xfrm>
-            <a:off x="5232734" y="3276135"/>
-            <a:ext cx="5300980" cy="245110"/>
+            <a:off x="6184900" y="3248025"/>
+            <a:ext cx="4038600" cy="261610"/>
           </a:xfrm>
           <a:prstGeom prst="rect">
             <a:avLst/>
@@ -48253,24 +48302,34 @@
               </a:lnSpc>
             </a:pPr>
             <a:r>
-              <a:rPr sz="1700" i="1" spc="-5" dirty="0">
+              <a:rPr lang="nl-NL" sz="1700" i="1" spc="-5" dirty="0">
                 <a:solidFill>
                   <a:srgbClr val="46C249"/>
                 </a:solidFill>
                 <a:latin typeface="Consolas"/>
                 <a:cs typeface="Consolas"/>
               </a:rPr>
-              <a:t>/</a:t>
-            </a:r>
-            <a:r>
-              <a:rPr sz="1700" i="1" spc="5" dirty="0">
+              <a:t>// </a:t>
+            </a:r>
+            <a:r>
+              <a:rPr sz="1700" i="1" spc="-5" dirty="0" err="1">
                 <a:solidFill>
                   <a:srgbClr val="46C249"/>
                 </a:solidFill>
                 <a:latin typeface="Consolas"/>
                 <a:cs typeface="Consolas"/>
               </a:rPr>
-              <a:t>/</a:t>
+              <a:t>invoege</a:t>
+            </a:r>
+            <a:r>
+              <a:rPr sz="1700" i="1" spc="5" dirty="0" err="1">
+                <a:solidFill>
+                  <a:srgbClr val="46C249"/>
+                </a:solidFill>
+                <a:latin typeface="Consolas"/>
+                <a:cs typeface="Consolas"/>
+              </a:rPr>
+              <a:t>n</a:t>
             </a:r>
             <a:r>
               <a:rPr sz="1700" i="1" dirty="0">
@@ -48300,7 +48359,7 @@
                 <a:latin typeface="Consolas"/>
                 <a:cs typeface="Consolas"/>
               </a:rPr>
-              <a:t>Nie</a:t>
+              <a:t>bi</a:t>
             </a:r>
             <a:r>
               <a:rPr sz="1700" i="1" spc="5" dirty="0">
@@ -48310,7 +48369,7 @@
                 <a:latin typeface="Consolas"/>
                 <a:cs typeface="Consolas"/>
               </a:rPr>
-              <a:t>t</a:t>
+              <a:t>j</a:t>
             </a:r>
             <a:r>
               <a:rPr sz="1700" i="1" dirty="0">
@@ -48323,7 +48382,7 @@
               <a:t> </a:t>
             </a:r>
             <a:r>
-              <a:rPr sz="1700" i="1" spc="80" dirty="0">
+              <a:rPr sz="1700" i="1" spc="85" dirty="0">
                 <a:solidFill>
                   <a:srgbClr val="46C249"/>
                 </a:solidFill>
@@ -48340,129 +48399,9 @@
                 <a:latin typeface="Consolas"/>
                 <a:cs typeface="Consolas"/>
               </a:rPr>
-              <a:t>vergeten</a:t>
-            </a:r>
-            <a:r>
-              <a:rPr sz="1700" i="1" spc="5" dirty="0">
-                <a:solidFill>
-                  <a:srgbClr val="46C249"/>
-                </a:solidFill>
-                <a:latin typeface="Consolas"/>
-                <a:cs typeface="Consolas"/>
-              </a:rPr>
-              <a:t>:</a:t>
-            </a:r>
-            <a:r>
-              <a:rPr sz="1700" i="1" dirty="0">
-                <a:solidFill>
-                  <a:srgbClr val="46C249"/>
-                </a:solidFill>
-                <a:latin typeface="Times New Roman"/>
-                <a:cs typeface="Times New Roman"/>
-              </a:rPr>
-              <a:t> </a:t>
-            </a:r>
-            <a:r>
-              <a:rPr sz="1700" i="1" spc="85" dirty="0">
-                <a:solidFill>
-                  <a:srgbClr val="46C249"/>
-                </a:solidFill>
-                <a:latin typeface="Times New Roman"/>
-                <a:cs typeface="Times New Roman"/>
-              </a:rPr>
-              <a:t> </a:t>
-            </a:r>
-            <a:r>
-              <a:rPr sz="1700" i="1" spc="-5" dirty="0">
-                <a:solidFill>
-                  <a:srgbClr val="46C249"/>
-                </a:solidFill>
-                <a:latin typeface="Consolas"/>
-                <a:cs typeface="Consolas"/>
-              </a:rPr>
-              <a:t>invoege</a:t>
-            </a:r>
-            <a:r>
-              <a:rPr sz="1700" i="1" spc="5" dirty="0">
-                <a:solidFill>
-                  <a:srgbClr val="46C249"/>
-                </a:solidFill>
-                <a:latin typeface="Consolas"/>
-                <a:cs typeface="Consolas"/>
-              </a:rPr>
-              <a:t>n</a:t>
-            </a:r>
-            <a:r>
-              <a:rPr sz="1700" i="1" dirty="0">
-                <a:solidFill>
-                  <a:srgbClr val="46C249"/>
-                </a:solidFill>
-                <a:latin typeface="Times New Roman"/>
-                <a:cs typeface="Times New Roman"/>
-              </a:rPr>
-              <a:t> </a:t>
-            </a:r>
-            <a:r>
-              <a:rPr sz="1700" i="1" spc="80" dirty="0">
-                <a:solidFill>
-                  <a:srgbClr val="46C249"/>
-                </a:solidFill>
-                <a:latin typeface="Times New Roman"/>
-                <a:cs typeface="Times New Roman"/>
-              </a:rPr>
-              <a:t> </a:t>
-            </a:r>
-            <a:r>
-              <a:rPr sz="1700" i="1" dirty="0">
-                <a:solidFill>
-                  <a:srgbClr val="46C249"/>
-                </a:solidFill>
-                <a:latin typeface="Consolas"/>
-                <a:cs typeface="Consolas"/>
-              </a:rPr>
-              <a:t>bi</a:t>
-            </a:r>
-            <a:r>
-              <a:rPr sz="1700" i="1" spc="5" dirty="0">
-                <a:solidFill>
-                  <a:srgbClr val="46C249"/>
-                </a:solidFill>
-                <a:latin typeface="Consolas"/>
-                <a:cs typeface="Consolas"/>
-              </a:rPr>
-              <a:t>j</a:t>
-            </a:r>
-            <a:r>
-              <a:rPr sz="1700" i="1" dirty="0">
-                <a:solidFill>
-                  <a:srgbClr val="46C249"/>
-                </a:solidFill>
-                <a:latin typeface="Times New Roman"/>
-                <a:cs typeface="Times New Roman"/>
-              </a:rPr>
-              <a:t> </a:t>
-            </a:r>
-            <a:r>
-              <a:rPr sz="1700" i="1" spc="85" dirty="0">
-                <a:solidFill>
-                  <a:srgbClr val="46C249"/>
-                </a:solidFill>
-                <a:latin typeface="Times New Roman"/>
-                <a:cs typeface="Times New Roman"/>
-              </a:rPr>
-              <a:t> </a:t>
-            </a:r>
-            <a:r>
-              <a:rPr sz="1700" i="1" spc="-5" dirty="0">
-                <a:solidFill>
-                  <a:srgbClr val="46C249"/>
-                </a:solidFill>
-                <a:latin typeface="Consolas"/>
-                <a:cs typeface="Consolas"/>
-              </a:rPr>
               <a:t>declarations!</a:t>
             </a:r>
-            <a:endParaRPr sz="1700">
+            <a:endParaRPr sz="1700" dirty="0">
               <a:latin typeface="Consolas"/>
               <a:cs typeface="Consolas"/>
             </a:endParaRPr>
@@ -48477,7 +48416,7 @@
         </p:nvSpPr>
         <p:spPr>
           <a:xfrm>
-            <a:off x="1275564" y="4065580"/>
+            <a:off x="1275588" y="4320588"/>
             <a:ext cx="2904490" cy="773430"/>
           </a:xfrm>
           <a:prstGeom prst="rect">
@@ -48610,7 +48549,7 @@
               </a:rPr>
               <a:t>{</a:t>
             </a:r>
-            <a:endParaRPr sz="1700">
+            <a:endParaRPr sz="1700" dirty="0">
               <a:latin typeface="Consolas"/>
               <a:cs typeface="Consolas"/>
             </a:endParaRPr>
@@ -48631,7 +48570,7 @@
               </a:rPr>
               <a:t>…</a:t>
             </a:r>
-            <a:endParaRPr sz="1700">
+            <a:endParaRPr sz="1700" dirty="0">
               <a:latin typeface="Consolas"/>
               <a:cs typeface="Consolas"/>
             </a:endParaRPr>
@@ -48652,7 +48591,7 @@
               </a:rPr>
               <a:t>}</a:t>
             </a:r>
-            <a:endParaRPr sz="1700">
+            <a:endParaRPr sz="1700" dirty="0">
               <a:latin typeface="Consolas"/>
               <a:cs typeface="Consolas"/>
             </a:endParaRPr>

</xml_diff>